<commit_message>
[docs]: laboratory 2 repository seperate & reading 3 upload
</commit_message>
<xml_diff>
--- a/reading/rd3/reading3.pptx
+++ b/reading/rd3/reading3.pptx
@@ -9,7 +9,8 @@
     <p:sldId id="257" r:id="rId3"/>
     <p:sldId id="258" r:id="rId4"/>
     <p:sldId id="259" r:id="rId5"/>
-    <p:sldId id="260" r:id="rId6"/>
+    <p:sldId id="261" r:id="rId6"/>
+    <p:sldId id="260" r:id="rId7"/>
   </p:sldIdLst>
   <p:sldSz cx="12192000" cy="6858000"/>
   <p:notesSz cx="6858000" cy="9144000"/>
@@ -263,7 +264,7 @@
           <a:p>
             <a:fld id="{C128FA71-3A18-48C0-980F-4B68F7F63042}" type="datetime1">
               <a:rPr lang="en-US" smtClean="0"/>
-              <a:t>1/26/26</a:t>
+              <a:t>2/1/26</a:t>
             </a:fld>
             <a:endParaRPr lang="en-US"/>
           </a:p>
@@ -461,7 +462,7 @@
           <a:p>
             <a:fld id="{7104EDB3-C0E8-45F8-9E1D-1B6C8D1880C0}" type="datetime1">
               <a:rPr lang="en-US" smtClean="0"/>
-              <a:t>1/26/26</a:t>
+              <a:t>2/1/26</a:t>
             </a:fld>
             <a:endParaRPr lang="en-US"/>
           </a:p>
@@ -669,7 +670,7 @@
           <a:p>
             <a:fld id="{9CF0EC4B-54ED-4041-B552-9BA760FA3DBA}" type="datetime1">
               <a:rPr lang="en-US" smtClean="0"/>
-              <a:t>1/26/26</a:t>
+              <a:t>2/1/26</a:t>
             </a:fld>
             <a:endParaRPr lang="en-US"/>
           </a:p>
@@ -867,7 +868,7 @@
           <a:p>
             <a:fld id="{51C1210E-201E-4473-82AC-2466F5386C38}" type="datetime1">
               <a:rPr lang="en-US" smtClean="0"/>
-              <a:t>1/26/26</a:t>
+              <a:t>2/1/26</a:t>
             </a:fld>
             <a:endParaRPr lang="en-US"/>
           </a:p>
@@ -1142,7 +1143,7 @@
           <a:p>
             <a:fld id="{B01EA198-6CAB-4B8F-B93F-1F9C8C4B6CE7}" type="datetime1">
               <a:rPr lang="en-US" smtClean="0"/>
-              <a:t>1/26/26</a:t>
+              <a:t>2/1/26</a:t>
             </a:fld>
             <a:endParaRPr lang="en-US"/>
           </a:p>
@@ -1407,7 +1408,7 @@
           <a:p>
             <a:fld id="{CA06041F-4525-44D5-AA4F-332294BF1F56}" type="datetime1">
               <a:rPr lang="en-US" smtClean="0"/>
-              <a:t>1/26/26</a:t>
+              <a:t>2/1/26</a:t>
             </a:fld>
             <a:endParaRPr lang="en-US"/>
           </a:p>
@@ -1819,7 +1820,7 @@
           <a:p>
             <a:fld id="{F9557091-BBDF-4EB9-BA6B-2BB67AC4FC0F}" type="datetime1">
               <a:rPr lang="en-US" smtClean="0"/>
-              <a:t>1/26/26</a:t>
+              <a:t>2/1/26</a:t>
             </a:fld>
             <a:endParaRPr lang="en-US"/>
           </a:p>
@@ -1960,7 +1961,7 @@
           <a:p>
             <a:fld id="{2D6B226B-77A6-410C-9796-083F278E0125}" type="datetime1">
               <a:rPr lang="en-US" smtClean="0"/>
-              <a:t>1/26/26</a:t>
+              <a:t>2/1/26</a:t>
             </a:fld>
             <a:endParaRPr lang="en-US"/>
           </a:p>
@@ -2073,7 +2074,7 @@
           <a:p>
             <a:fld id="{A23A578B-D289-4C40-8593-3D356C49DA58}" type="datetime1">
               <a:rPr lang="en-US" smtClean="0"/>
-              <a:t>1/26/26</a:t>
+              <a:t>2/1/26</a:t>
             </a:fld>
             <a:endParaRPr lang="en-US"/>
           </a:p>
@@ -2384,7 +2385,7 @@
           <a:p>
             <a:fld id="{713DFAE3-14DB-48A7-A80F-80DDB072CE3D}" type="datetime1">
               <a:rPr lang="en-US" smtClean="0"/>
-              <a:t>1/26/26</a:t>
+              <a:t>2/1/26</a:t>
             </a:fld>
             <a:endParaRPr lang="en-US"/>
           </a:p>
@@ -2672,7 +2673,7 @@
           <a:p>
             <a:fld id="{92C5EAEF-6478-4102-8F5D-A5FE9FC97ACB}" type="datetime1">
               <a:rPr lang="en-US" smtClean="0"/>
-              <a:t>1/26/26</a:t>
+              <a:t>2/1/26</a:t>
             </a:fld>
             <a:endParaRPr lang="en-US"/>
           </a:p>
@@ -2913,7 +2914,7 @@
           <a:p>
             <a:fld id="{67F45AC6-C491-4585-A584-9CE2AF7D5500}" type="datetime1">
               <a:rPr lang="en-US" smtClean="0"/>
-              <a:t>1/26/26</a:t>
+              <a:t>2/1/26</a:t>
             </a:fld>
             <a:endParaRPr lang="en-US"/>
           </a:p>
@@ -3550,7 +3551,7 @@
                 <a:latin typeface="Times New Roman" panose="02020603050405020304" pitchFamily="18" charset="0"/>
                 <a:cs typeface="Times New Roman" panose="02020603050405020304" pitchFamily="18" charset="0"/>
               </a:rPr>
-              <a:t>Deep learning-based NLP data pipeline for HER-scanned document information extraction</a:t>
+              <a:t>An Even Easier Introduction to CUDA</a:t>
             </a:r>
           </a:p>
         </p:txBody>
@@ -4317,7 +4318,7 @@
           <a:p>
             <a:r>
               <a:rPr lang="en-US" sz="4000" dirty="0"/>
-              <a:t>Introduction &amp; Related Work</a:t>
+              <a:t>Introduction to CUDA</a:t>
             </a:r>
           </a:p>
         </p:txBody>
@@ -4409,64 +4410,165 @@
         <p:spPr>
           <a:xfrm>
             <a:off x="626850" y="2018806"/>
-            <a:ext cx="10656846" cy="2264392"/>
+            <a:ext cx="10656846" cy="4392504"/>
           </a:xfrm>
         </p:spPr>
         <p:txBody>
           <a:bodyPr>
-            <a:normAutofit fontScale="92500" lnSpcReduction="10000"/>
+            <a:normAutofit/>
           </a:bodyPr>
           <a:lstStyle/>
           <a:p>
             <a:r>
               <a:rPr lang="en-US" sz="2200" dirty="0"/>
-              <a:t>OCR is continuously evolving, incorporating methods such as Statistical Models (Machine Learning) and Deep Learning (i.e., LSTM).</a:t>
+              <a:t>__global__: kernel functions callable from the host</a:t>
             </a:r>
           </a:p>
           <a:p>
             <a:r>
               <a:rPr lang="en-US" sz="2200" dirty="0"/>
-              <a:t>Traditional OCR involves the processes of segmentation, normalization, feature extraction, and classification.</a:t>
+              <a:t>__device__: kernel functions callable from the kernel (__device__ or __global__)</a:t>
             </a:r>
           </a:p>
           <a:p>
             <a:r>
               <a:rPr lang="en-US" sz="2200" dirty="0"/>
-              <a:t>OCR technology and evaluation methods are less developed for the medical domain compared to other domains, and this paper studies OCR methods for EHR (Electronic Health Records)</a:t>
-            </a:r>
-          </a:p>
-        </p:txBody>
-      </p:sp>
-      <p:pic>
-        <p:nvPicPr>
-          <p:cNvPr id="11" name="Picture 10" descr="A close-up of a whiteboard&#10;&#10;AI-generated content may be incorrect.">
-            <a:extLst>
-              <a:ext uri="{FF2B5EF4-FFF2-40B4-BE49-F238E27FC236}">
-                <a16:creationId xmlns:a16="http://schemas.microsoft.com/office/drawing/2014/main" id="{94EE0040-3AE8-3F9E-D8CE-87DE493FE64D}"/>
-              </a:ext>
-            </a:extLst>
-          </p:cNvPr>
-          <p:cNvPicPr>
-            <a:picLocks noChangeAspect="1"/>
-          </p:cNvPicPr>
-          <p:nvPr/>
-        </p:nvPicPr>
-        <p:blipFill>
-          <a:blip r:embed="rId2"/>
-          <a:stretch>
-            <a:fillRect/>
-          </a:stretch>
-        </p:blipFill>
-        <p:spPr>
-          <a:xfrm>
-            <a:off x="2612148" y="4153875"/>
-            <a:ext cx="6251171" cy="2833448"/>
-          </a:xfrm>
-          <a:prstGeom prst="rect">
-            <a:avLst/>
-          </a:prstGeom>
-        </p:spPr>
-      </p:pic>
+              <a:t>__host__: host functions callable from the host</a:t>
+            </a:r>
+          </a:p>
+          <a:p>
+            <a:endParaRPr lang="en-US" sz="2200" dirty="0"/>
+          </a:p>
+          <a:p>
+            <a:r>
+              <a:rPr lang="en-US" sz="2200" dirty="0" err="1"/>
+              <a:t>cudaMallocManaged</a:t>
+            </a:r>
+            <a:r>
+              <a:rPr lang="en-US" sz="2200" dirty="0"/>
+              <a:t>(void** </a:t>
+            </a:r>
+            <a:r>
+              <a:rPr lang="en-US" sz="2200" dirty="0" err="1"/>
+              <a:t>dptr</a:t>
+            </a:r>
+            <a:r>
+              <a:rPr lang="en-US" sz="2200" dirty="0"/>
+              <a:t>, </a:t>
+            </a:r>
+            <a:r>
+              <a:rPr lang="en-US" sz="2200" dirty="0" err="1"/>
+              <a:t>size_t</a:t>
+            </a:r>
+            <a:r>
+              <a:rPr lang="en-US" sz="2200" dirty="0"/>
+              <a:t> size, unsinged int flags=</a:t>
+            </a:r>
+            <a:r>
+              <a:rPr lang="en-US" sz="2200" dirty="0" err="1"/>
+              <a:t>cudaMemAttachGlobal</a:t>
+            </a:r>
+            <a:r>
+              <a:rPr lang="en-US" sz="2200" dirty="0"/>
+              <a:t>): allocates memory (</a:t>
+            </a:r>
+            <a:r>
+              <a:rPr lang="en-US" sz="2200" dirty="0" err="1"/>
+              <a:t>manged</a:t>
+            </a:r>
+            <a:r>
+              <a:rPr lang="en-US" sz="2200" dirty="0"/>
+              <a:t> by the unified memory system)</a:t>
+            </a:r>
+          </a:p>
+          <a:p>
+            <a:r>
+              <a:rPr lang="en-US" sz="2200" dirty="0" err="1"/>
+              <a:t>cudaMalloc</a:t>
+            </a:r>
+            <a:r>
+              <a:rPr lang="en-US" sz="2200" dirty="0"/>
+              <a:t>(void** </a:t>
+            </a:r>
+            <a:r>
+              <a:rPr lang="en-US" sz="2200" dirty="0" err="1"/>
+              <a:t>dptr</a:t>
+            </a:r>
+            <a:r>
+              <a:rPr lang="en-US" sz="2200" dirty="0"/>
+              <a:t>, </a:t>
+            </a:r>
+            <a:r>
+              <a:rPr lang="en-US" sz="2200" dirty="0" err="1"/>
+              <a:t>size_t</a:t>
+            </a:r>
+            <a:r>
+              <a:rPr lang="en-US" sz="2200" dirty="0"/>
+              <a:t> size): allocate memory on the device(GPU)</a:t>
+            </a:r>
+          </a:p>
+          <a:p>
+            <a:r>
+              <a:rPr lang="en-US" sz="2200" dirty="0" err="1"/>
+              <a:t>cudaMemPrefetchAsync</a:t>
+            </a:r>
+            <a:r>
+              <a:rPr lang="en-US" sz="2200" dirty="0"/>
+              <a:t>(const void* </a:t>
+            </a:r>
+            <a:r>
+              <a:rPr lang="en-US" sz="2200" dirty="0" err="1"/>
+              <a:t>dptr</a:t>
+            </a:r>
+            <a:r>
+              <a:rPr lang="en-US" sz="2200" dirty="0"/>
+              <a:t>, </a:t>
+            </a:r>
+            <a:r>
+              <a:rPr lang="en-US" sz="2200" dirty="0" err="1"/>
+              <a:t>size_t</a:t>
+            </a:r>
+            <a:r>
+              <a:rPr lang="en-US" sz="2200" dirty="0"/>
+              <a:t> count, </a:t>
+            </a:r>
+            <a:r>
+              <a:rPr lang="en-US" sz="2200" dirty="0" err="1"/>
+              <a:t>cudaMemLocation</a:t>
+            </a:r>
+            <a:r>
+              <a:rPr lang="en-US" sz="2200" dirty="0"/>
+              <a:t>, unsigned int, </a:t>
+            </a:r>
+            <a:r>
+              <a:rPr lang="en-US" sz="2200" dirty="0" err="1"/>
+              <a:t>cudaStream_t</a:t>
+            </a:r>
+            <a:r>
+              <a:rPr lang="en-US" sz="2200" dirty="0"/>
+              <a:t>): prefetch memory to the specified destination location</a:t>
+            </a:r>
+          </a:p>
+          <a:p>
+            <a:r>
+              <a:rPr lang="en-US" sz="2200" dirty="0" err="1"/>
+              <a:t>cudaFree</a:t>
+            </a:r>
+            <a:r>
+              <a:rPr lang="en-US" sz="2200" dirty="0"/>
+              <a:t>(void* </a:t>
+            </a:r>
+            <a:r>
+              <a:rPr lang="en-US" sz="2200" dirty="0" err="1"/>
+              <a:t>dptr</a:t>
+            </a:r>
+            <a:r>
+              <a:rPr lang="en-US" sz="2200" dirty="0"/>
+              <a:t>): frees memory on the device (GPU)</a:t>
+            </a:r>
+          </a:p>
+        </p:txBody>
+      </p:sp>
     </p:spTree>
     <p:extLst>
       <p:ext uri="{BB962C8B-B14F-4D97-AF65-F5344CB8AC3E}">
@@ -4790,7 +4892,7 @@
           <a:p>
             <a:r>
               <a:rPr lang="en-US" sz="4000" dirty="0"/>
-              <a:t>Methods</a:t>
+              <a:t>Introduction to CUDA</a:t>
             </a:r>
           </a:p>
         </p:txBody>
@@ -4881,7 +4983,7 @@
         </p:nvSpPr>
         <p:spPr>
           <a:xfrm>
-            <a:off x="751063" y="2541285"/>
+            <a:off x="626850" y="2221992"/>
             <a:ext cx="10610088" cy="4316715"/>
           </a:xfrm>
         </p:spPr>
@@ -4891,77 +4993,85 @@
           </a:bodyPr>
           <a:lstStyle/>
           <a:p>
+            <a:pPr marL="0" indent="0">
+              <a:buNone/>
+            </a:pPr>
             <a:r>
               <a:rPr lang="en-US" dirty="0"/>
-              <a:t>Data source: UTMB HER</a:t>
-            </a:r>
-            <a:endParaRPr lang="en-US" i="1" dirty="0"/>
-          </a:p>
-          <a:p>
+              <a:t>global function call:</a:t>
+            </a:r>
+          </a:p>
+          <a:p>
+            <a:pPr marL="0" indent="0">
+              <a:buNone/>
+            </a:pPr>
+            <a:r>
+              <a:rPr lang="en-US" dirty="0" err="1"/>
+              <a:t>function_name</a:t>
+            </a:r>
             <a:r>
               <a:rPr lang="en-US" dirty="0"/>
-              <a:t>Preprocessing: OpenCV</a:t>
-            </a:r>
-          </a:p>
-          <a:p>
+              <a:t>&lt;&lt;&lt;</a:t>
+            </a:r>
+            <a:r>
+              <a:rPr lang="en-US" dirty="0" err="1"/>
+              <a:t>gridDim</a:t>
+            </a:r>
             <a:r>
               <a:rPr lang="en-US" dirty="0"/>
-              <a:t>OCR: Tesseract v 4.0.0</a:t>
-            </a:r>
-          </a:p>
-          <a:p>
+              <a:t>, </a:t>
+            </a:r>
+            <a:r>
+              <a:rPr lang="en-US" dirty="0" err="1"/>
+              <a:t>blockDim</a:t>
+            </a:r>
             <a:r>
               <a:rPr lang="en-US" dirty="0"/>
-              <a:t>Deidentification</a:t>
-            </a:r>
-          </a:p>
-          <a:p>
+              <a:t>, </a:t>
+            </a:r>
+            <a:r>
+              <a:rPr lang="en-US" dirty="0" err="1"/>
+              <a:t>sharedMemBytes</a:t>
+            </a:r>
             <a:r>
               <a:rPr lang="en-US" dirty="0"/>
-              <a:t>Segmentation</a:t>
-            </a:r>
-          </a:p>
-          <a:p>
+              <a:t>, stream&gt;&gt;&gt;(argument1, argument2);</a:t>
+            </a:r>
+          </a:p>
+          <a:p>
+            <a:pPr marL="0" indent="0">
+              <a:buNone/>
+            </a:pPr>
+            <a:endParaRPr lang="en-US" dirty="0"/>
+          </a:p>
+          <a:p>
+            <a:pPr marL="0" indent="0">
+              <a:buNone/>
+            </a:pPr>
+            <a:r>
+              <a:rPr lang="en-US" dirty="0" err="1"/>
+              <a:t>cuda</a:t>
+            </a:r>
             <a:r>
               <a:rPr lang="en-US" dirty="0"/>
-              <a:t>Classification</a:t>
-            </a:r>
-          </a:p>
-          <a:p>
-            <a:endParaRPr lang="en-US" dirty="0"/>
-          </a:p>
-        </p:txBody>
-      </p:sp>
-      <p:pic>
-        <p:nvPicPr>
-          <p:cNvPr id="4" name="Picture 3" descr="A close-up of a list of text&#10;&#10;AI-generated content may be incorrect.">
-            <a:extLst>
-              <a:ext uri="{FF2B5EF4-FFF2-40B4-BE49-F238E27FC236}">
-                <a16:creationId xmlns:a16="http://schemas.microsoft.com/office/drawing/2014/main" id="{EE261EF9-997F-6EDD-EBBE-C1CD8317B277}"/>
-              </a:ext>
-            </a:extLst>
-          </p:cNvPr>
-          <p:cNvPicPr>
-            <a:picLocks noChangeAspect="1"/>
-          </p:cNvPicPr>
-          <p:nvPr/>
-        </p:nvPicPr>
-        <p:blipFill>
-          <a:blip r:embed="rId2"/>
-          <a:stretch>
-            <a:fillRect/>
-          </a:stretch>
-        </p:blipFill>
-        <p:spPr>
-          <a:xfrm>
-            <a:off x="5578943" y="1463040"/>
-            <a:ext cx="6015380" cy="5394960"/>
-          </a:xfrm>
-          <a:prstGeom prst="rect">
-            <a:avLst/>
-          </a:prstGeom>
-        </p:spPr>
-      </p:pic>
+              <a:t> synchronize:</a:t>
+            </a:r>
+          </a:p>
+          <a:p>
+            <a:pPr marL="0" indent="0">
+              <a:buNone/>
+            </a:pPr>
+            <a:r>
+              <a:rPr lang="en-US" dirty="0" err="1"/>
+              <a:t>cudaDeviceSynchronize</a:t>
+            </a:r>
+            <a:r>
+              <a:rPr lang="en-US" dirty="0"/>
+              <a:t>(): wait for compute device to finish</a:t>
+            </a:r>
+          </a:p>
+        </p:txBody>
+      </p:sp>
     </p:spTree>
     <p:extLst>
       <p:ext uri="{BB962C8B-B14F-4D97-AF65-F5344CB8AC3E}">
@@ -5285,7 +5395,7 @@
           <a:p>
             <a:r>
               <a:rPr lang="en-US" sz="4000" dirty="0"/>
-              <a:t>Results</a:t>
+              <a:t>Introduction to CUDA</a:t>
             </a:r>
           </a:p>
         </p:txBody>
@@ -5386,35 +5496,163 @@
           </a:bodyPr>
           <a:lstStyle/>
           <a:p>
+            <a:pPr marL="0" indent="0">
+              <a:buNone/>
+            </a:pPr>
+            <a:r>
+              <a:rPr lang="en-US" sz="2400" dirty="0"/>
+              <a:t>Cuda Kernel Built-in functions and variables:</a:t>
+            </a:r>
+          </a:p>
+          <a:p>
+            <a:pPr marL="0" indent="0">
+              <a:buNone/>
+            </a:pPr>
+            <a:r>
+              <a:rPr lang="en-US" sz="2400" dirty="0"/>
+              <a:t>__</a:t>
+            </a:r>
+            <a:r>
+              <a:rPr lang="en-US" sz="2400" dirty="0" err="1"/>
+              <a:t>syncthreads</a:t>
+            </a:r>
+            <a:r>
+              <a:rPr lang="en-US" sz="2400" dirty="0"/>
+              <a:t>(): all threads in the block sync</a:t>
+            </a:r>
+          </a:p>
+          <a:p>
+            <a:pPr marL="0" indent="0">
+              <a:buNone/>
+            </a:pPr>
+            <a:r>
+              <a:rPr lang="en-US" sz="2600" dirty="0" err="1"/>
+              <a:t>threadIdx.x</a:t>
+            </a:r>
             <a:r>
               <a:rPr lang="en-US" sz="2600" dirty="0"/>
-              <a:t>Reports take many forms, including narratives in printed text, images, tables, and handwritings</a:t>
-            </a:r>
-          </a:p>
-          <a:p>
+              <a:t>, </a:t>
+            </a:r>
+            <a:r>
+              <a:rPr lang="en-US" sz="2600" dirty="0" err="1"/>
+              <a:t>threadIdx.y</a:t>
+            </a:r>
             <a:r>
               <a:rPr lang="en-US" sz="2600" dirty="0"/>
-              <a:t>While it extracts data from text and tables well, its accuracy is relatively low for images and handwriting</a:t>
-            </a:r>
-          </a:p>
-          <a:p>
+              <a:t>, </a:t>
+            </a:r>
+            <a:r>
+              <a:rPr lang="en-US" sz="2600" dirty="0" err="1"/>
+              <a:t>threadIdx.z</a:t>
+            </a:r>
+            <a:endParaRPr lang="en-US" sz="2600" dirty="0"/>
+          </a:p>
+          <a:p>
+            <a:pPr marL="0" indent="0">
+              <a:buNone/>
+            </a:pPr>
+            <a:r>
+              <a:rPr lang="en-US" sz="2600" dirty="0" err="1"/>
+              <a:t>blockDim.x</a:t>
+            </a:r>
             <a:r>
               <a:rPr lang="en-US" sz="2600" dirty="0"/>
-              <a:t>Overall accuracy is higher for deep learning-based sequence models than for bag-of-words models</a:t>
-            </a:r>
-          </a:p>
-          <a:p>
+              <a:t>, </a:t>
+            </a:r>
+            <a:r>
+              <a:rPr lang="en-US" sz="2600" dirty="0" err="1"/>
+              <a:t>blockDim.y</a:t>
+            </a:r>
             <a:r>
               <a:rPr lang="en-US" sz="2600" dirty="0"/>
-              <a:t>The </a:t>
+              <a:t>, </a:t>
             </a:r>
             <a:r>
               <a:rPr lang="en-US" sz="2600" dirty="0" err="1"/>
-              <a:t>ClinicalBERT</a:t>
-            </a:r>
+              <a:t>blockDim.z</a:t>
+            </a:r>
+            <a:endParaRPr lang="en-US" sz="2600" dirty="0"/>
+          </a:p>
+          <a:p>
+            <a:pPr marL="0" indent="0">
+              <a:buNone/>
+            </a:pPr>
             <a:r>
               <a:rPr lang="en-US" sz="2600" dirty="0"/>
-              <a:t> model showed the best performance even with a small amount of training data</a:t>
+              <a:t>(0 &lt;= </a:t>
+            </a:r>
+            <a:r>
+              <a:rPr lang="en-US" sz="2600" dirty="0" err="1"/>
+              <a:t>threadIdx.x</a:t>
+            </a:r>
+            <a:r>
+              <a:rPr lang="en-US" sz="2600" dirty="0"/>
+              <a:t> &lt; </a:t>
+            </a:r>
+            <a:r>
+              <a:rPr lang="en-US" sz="2600" dirty="0" err="1"/>
+              <a:t>blockDim.x</a:t>
+            </a:r>
+            <a:r>
+              <a:rPr lang="en-US" sz="2600" dirty="0"/>
+              <a:t>)</a:t>
+            </a:r>
+          </a:p>
+          <a:p>
+            <a:pPr marL="0" indent="0">
+              <a:buNone/>
+            </a:pPr>
+            <a:r>
+              <a:rPr lang="en-US" sz="2600" dirty="0" err="1"/>
+              <a:t>blockIdx.x</a:t>
+            </a:r>
+            <a:r>
+              <a:rPr lang="en-US" sz="2600" dirty="0"/>
+              <a:t>, </a:t>
+            </a:r>
+            <a:r>
+              <a:rPr lang="en-US" sz="2600" dirty="0" err="1"/>
+              <a:t>blockIdx.y</a:t>
+            </a:r>
+            <a:r>
+              <a:rPr lang="en-US" sz="2600" dirty="0"/>
+              <a:t> </a:t>
+            </a:r>
+            <a:r>
+              <a:rPr lang="en-US" sz="2600" dirty="0" err="1"/>
+              <a:t>blockIdx.z</a:t>
+            </a:r>
+            <a:endParaRPr lang="en-US" sz="2600" dirty="0"/>
+          </a:p>
+          <a:p>
+            <a:pPr marL="0" indent="0">
+              <a:buNone/>
+            </a:pPr>
+            <a:r>
+              <a:rPr lang="en-US" sz="2600" dirty="0" err="1"/>
+              <a:t>warpSize</a:t>
+            </a:r>
+            <a:r>
+              <a:rPr lang="en-US" sz="2600" dirty="0"/>
+              <a:t>: size of warp</a:t>
+            </a:r>
+          </a:p>
+          <a:p>
+            <a:pPr marL="0" indent="0">
+              <a:buNone/>
+            </a:pPr>
+            <a:r>
+              <a:rPr lang="en-US" sz="2600" dirty="0"/>
+              <a:t>Kernel Keywords:</a:t>
+            </a:r>
+          </a:p>
+          <a:p>
+            <a:pPr marL="0" indent="0">
+              <a:buNone/>
+            </a:pPr>
+            <a:r>
+              <a:rPr lang="en-US" sz="2600" dirty="0"/>
+              <a:t>__shared__: shared memory (block share memory)</a:t>
             </a:r>
           </a:p>
         </p:txBody>
@@ -5433,6 +5671,106 @@
 </file>
 
 <file path=ppt/slides/slide5.xml><?xml version="1.0" encoding="utf-8"?>
+<p:sld xmlns:a="http://schemas.openxmlformats.org/drawingml/2006/main" xmlns:r="http://schemas.openxmlformats.org/officeDocument/2006/relationships" xmlns:p="http://schemas.openxmlformats.org/presentationml/2006/main">
+  <p:cSld>
+    <p:spTree>
+      <p:nvGrpSpPr>
+        <p:cNvPr id="1" name="">
+          <a:extLst>
+            <a:ext uri="{FF2B5EF4-FFF2-40B4-BE49-F238E27FC236}">
+              <a16:creationId xmlns:a16="http://schemas.microsoft.com/office/drawing/2014/main" id="{6E24C5ED-C136-F740-40C9-6078CBE2709C}"/>
+            </a:ext>
+          </a:extLst>
+        </p:cNvPr>
+        <p:cNvGrpSpPr/>
+        <p:nvPr/>
+      </p:nvGrpSpPr>
+      <p:grpSpPr>
+        <a:xfrm>
+          <a:off x="0" y="0"/>
+          <a:ext cx="0" cy="0"/>
+          <a:chOff x="0" y="0"/>
+          <a:chExt cx="0" cy="0"/>
+        </a:xfrm>
+      </p:grpSpPr>
+      <p:sp>
+        <p:nvSpPr>
+          <p:cNvPr id="2" name="Title 1">
+            <a:extLst>
+              <a:ext uri="{FF2B5EF4-FFF2-40B4-BE49-F238E27FC236}">
+                <a16:creationId xmlns:a16="http://schemas.microsoft.com/office/drawing/2014/main" id="{4C262DD1-AF72-6370-0946-6C3D0ACFDCF8}"/>
+              </a:ext>
+            </a:extLst>
+          </p:cNvPr>
+          <p:cNvSpPr>
+            <a:spLocks noGrp="1"/>
+          </p:cNvSpPr>
+          <p:nvPr>
+            <p:ph type="title"/>
+          </p:nvPr>
+        </p:nvSpPr>
+        <p:spPr>
+          <a:xfrm>
+            <a:off x="1115568" y="548640"/>
+            <a:ext cx="10168128" cy="1179576"/>
+          </a:xfrm>
+        </p:spPr>
+        <p:txBody>
+          <a:bodyPr>
+            <a:normAutofit/>
+          </a:bodyPr>
+          <a:lstStyle/>
+          <a:p>
+            <a:r>
+              <a:rPr lang="en-US" sz="4000" dirty="0"/>
+              <a:t>Introduction to CUDA</a:t>
+            </a:r>
+          </a:p>
+        </p:txBody>
+      </p:sp>
+      <p:pic>
+        <p:nvPicPr>
+          <p:cNvPr id="7" name="Content Placeholder 6" descr="A close-up of a whiteboard with blue writing&#10;&#10;AI-generated content may be incorrect.">
+            <a:extLst>
+              <a:ext uri="{FF2B5EF4-FFF2-40B4-BE49-F238E27FC236}">
+                <a16:creationId xmlns:a16="http://schemas.microsoft.com/office/drawing/2014/main" id="{5CE28994-26FF-1CE0-F65C-EE530CB2D9B6}"/>
+              </a:ext>
+            </a:extLst>
+          </p:cNvPr>
+          <p:cNvPicPr>
+            <a:picLocks noGrp="1" noChangeAspect="1"/>
+          </p:cNvPicPr>
+          <p:nvPr>
+            <p:ph idx="1"/>
+          </p:nvPr>
+        </p:nvPicPr>
+        <p:blipFill>
+          <a:blip r:embed="rId2"/>
+          <a:stretch>
+            <a:fillRect/>
+          </a:stretch>
+        </p:blipFill>
+        <p:spPr>
+          <a:xfrm>
+            <a:off x="1555379" y="1825625"/>
+            <a:ext cx="9081242" cy="4351338"/>
+          </a:xfrm>
+        </p:spPr>
+      </p:pic>
+    </p:spTree>
+    <p:extLst>
+      <p:ext uri="{BB962C8B-B14F-4D97-AF65-F5344CB8AC3E}">
+        <p14:creationId xmlns:p14="http://schemas.microsoft.com/office/powerpoint/2010/main" val="651821766"/>
+      </p:ext>
+    </p:extLst>
+  </p:cSld>
+  <p:clrMapOvr>
+    <a:masterClrMapping/>
+  </p:clrMapOvr>
+</p:sld>
+</file>
+
+<file path=ppt/slides/slide6.xml><?xml version="1.0" encoding="utf-8"?>
 <p:sld xmlns:a="http://schemas.openxmlformats.org/drawingml/2006/main" xmlns:r="http://schemas.openxmlformats.org/officeDocument/2006/relationships" xmlns:p="http://schemas.openxmlformats.org/presentationml/2006/main">
   <p:cSld>
     <p:spTree>
@@ -5479,23 +5817,14 @@
         </p:spPr>
         <p:txBody>
           <a:bodyPr>
-            <a:normAutofit fontScale="90000"/>
+            <a:normAutofit/>
           </a:bodyPr>
           <a:lstStyle/>
           <a:p>
             <a:r>
               <a:rPr lang="en-US" sz="4000" dirty="0"/>
-              <a:t>Question:</a:t>
-            </a:r>
-            <a:r>
-              <a:rPr lang="ko-KR" altLang="en-US" sz="4000" dirty="0"/>
-              <a:t> </a:t>
-            </a:r>
-            <a:r>
-              <a:rPr lang="en-US" altLang="ko-KR" sz="4000" dirty="0"/>
-              <a:t>What is the structure of the Deep Learning-based sequence model used in the paper?</a:t>
-            </a:r>
-            <a:endParaRPr lang="en-US" sz="4000" dirty="0"/>
+              <a:t>Question: Explain function of CUDA memory hierarchy and its scope</a:t>
+            </a:r>
           </a:p>
         </p:txBody>
       </p:sp>
@@ -5540,9 +5869,34 @@
               <a:buNone/>
             </a:pPr>
             <a:r>
+              <a:rPr lang="en-US" sz="2600" dirty="0">
+                <a:hlinkClick r:id="rId2"/>
+              </a:rPr>
+              <a:t>http://thebeardsage.com/cuda-memory-hierarchy/</a:t>
+            </a:r>
+            <a:endParaRPr lang="en-US" sz="2600" dirty="0"/>
+          </a:p>
+          <a:p>
+            <a:pPr marL="0" indent="0">
+              <a:buNone/>
+            </a:pPr>
+            <a:r>
               <a:rPr lang="en-US" sz="2600" dirty="0"/>
-              <a:t>The architecture used in the paper has two main inputs.</a:t>
-            </a:r>
+              <a:t>Global Memory: all threads and CPU, </a:t>
+            </a:r>
+            <a:r>
+              <a:rPr lang="en-US" sz="2600" dirty="0" err="1"/>
+              <a:t>cudaMalloc</a:t>
+            </a:r>
+            <a:r>
+              <a:rPr lang="en-US" sz="2600" dirty="0"/>
+              <a:t>, </a:t>
+            </a:r>
+            <a:r>
+              <a:rPr lang="en-US" sz="2600" dirty="0" err="1"/>
+              <a:t>cudaFree</a:t>
+            </a:r>
+            <a:endParaRPr lang="en-US" sz="2600" dirty="0"/>
           </a:p>
           <a:p>
             <a:pPr marL="0" indent="0">
@@ -5550,7 +5904,15 @@
             </a:pPr>
             <a:r>
               <a:rPr lang="en-US" sz="2600" dirty="0"/>
-              <a:t>It takes the words extracted from the previous OCR process and their positional information to create a sequence of appropriate token size, which is then fed into a sequence model.</a:t>
+              <a:t>Constant Memory: all threads and CPU (RO), __constant__ int </a:t>
+            </a:r>
+            <a:r>
+              <a:rPr lang="en-US" sz="2600" dirty="0" err="1"/>
+              <a:t>const_data</a:t>
+            </a:r>
+            <a:r>
+              <a:rPr lang="en-US" sz="2600" dirty="0"/>
+              <a:t>;</a:t>
             </a:r>
           </a:p>
           <a:p>
@@ -5559,7 +5921,15 @@
             </a:pPr>
             <a:r>
               <a:rPr lang="en-US" sz="2600" dirty="0"/>
-              <a:t>Separately, structed data such as positional information and page numbers are fed into a feedforward neural network (FFNN).</a:t>
+              <a:t>Shared Memory: per block, __shared__ int </a:t>
+            </a:r>
+            <a:r>
+              <a:rPr lang="en-US" sz="2600" dirty="0" err="1"/>
+              <a:t>shared_data</a:t>
+            </a:r>
+            <a:r>
+              <a:rPr lang="en-US" sz="2600" dirty="0"/>
+              <a:t>[64];</a:t>
             </a:r>
           </a:p>
           <a:p>
@@ -5568,14 +5938,46 @@
             </a:pPr>
             <a:r>
               <a:rPr lang="en-US" sz="2600" dirty="0"/>
-              <a:t>Finally, the outputs of these two modules are processed through another FFNN to produce three labels (AHI, SaO2, Other).</a:t>
-            </a:r>
+              <a:t>Local Memory: per thread</a:t>
+            </a:r>
+            <a:r>
+              <a:rPr lang="en-US" altLang="ko-KR" sz="2600" dirty="0"/>
+              <a:t>,</a:t>
+            </a:r>
+            <a:r>
+              <a:rPr lang="ko-KR" altLang="en-US" sz="2600" dirty="0"/>
+              <a:t> </a:t>
+            </a:r>
+            <a:r>
+              <a:rPr lang="en-US" altLang="ko-KR" sz="2600" dirty="0"/>
+              <a:t>int </a:t>
+            </a:r>
+            <a:r>
+              <a:rPr lang="en-US" altLang="ko-KR" sz="2600" dirty="0" err="1"/>
+              <a:t>local_data</a:t>
+            </a:r>
+            <a:r>
+              <a:rPr lang="en-US" altLang="ko-KR" sz="2600" dirty="0"/>
+              <a:t>[64]; (decide by compiler)</a:t>
+            </a:r>
+            <a:endParaRPr lang="en-US" sz="2600" dirty="0"/>
           </a:p>
           <a:p>
             <a:pPr marL="0" indent="0">
               <a:buNone/>
             </a:pPr>
-            <a:endParaRPr lang="en-US" sz="2600" dirty="0"/>
+            <a:r>
+              <a:rPr lang="en-US" sz="2600" dirty="0"/>
+              <a:t>Register: per thread, int </a:t>
+            </a:r>
+            <a:r>
+              <a:rPr lang="en-US" sz="2600" dirty="0" err="1"/>
+              <a:t>register_data</a:t>
+            </a:r>
+            <a:r>
+              <a:rPr lang="en-US" sz="2600" dirty="0"/>
+              <a:t>; (decide by compiler)</a:t>
+            </a:r>
           </a:p>
         </p:txBody>
       </p:sp>

</xml_diff>